<commit_message>
List of completed tasks so far, updated PP
</commit_message>
<xml_diff>
--- a/Fit or Fail Technical Status Presentation.pptx
+++ b/Fit or Fail Technical Status Presentation.pptx
@@ -263,7 +263,7 @@
           <a:p>
             <a:fld id="{92002A70-311A-4772-9C04-FF4E337CEBA6}" type="datetimeFigureOut">
               <a:rPr lang="en-US" smtClean="0"/>
-              <a:t>3/23/2020</a:t>
+              <a:t>3/24/2020</a:t>
             </a:fld>
             <a:endParaRPr lang="en-US"/>
           </a:p>
@@ -474,7 +474,7 @@
           <a:p>
             <a:fld id="{92002A70-311A-4772-9C04-FF4E337CEBA6}" type="datetimeFigureOut">
               <a:rPr lang="en-US" smtClean="0"/>
-              <a:t>3/23/2020</a:t>
+              <a:t>3/24/2020</a:t>
             </a:fld>
             <a:endParaRPr lang="en-US"/>
           </a:p>
@@ -689,7 +689,7 @@
           <a:p>
             <a:fld id="{92002A70-311A-4772-9C04-FF4E337CEBA6}" type="datetimeFigureOut">
               <a:rPr lang="en-US" smtClean="0"/>
-              <a:t>3/23/2020</a:t>
+              <a:t>3/24/2020</a:t>
             </a:fld>
             <a:endParaRPr lang="en-US"/>
           </a:p>
@@ -890,7 +890,7 @@
           <a:p>
             <a:fld id="{92002A70-311A-4772-9C04-FF4E337CEBA6}" type="datetimeFigureOut">
               <a:rPr lang="en-US" smtClean="0"/>
-              <a:t>3/23/2020</a:t>
+              <a:t>3/24/2020</a:t>
             </a:fld>
             <a:endParaRPr lang="en-US"/>
           </a:p>
@@ -1169,7 +1169,7 @@
           <a:p>
             <a:fld id="{92002A70-311A-4772-9C04-FF4E337CEBA6}" type="datetimeFigureOut">
               <a:rPr lang="en-US" smtClean="0"/>
-              <a:t>3/23/2020</a:t>
+              <a:t>3/24/2020</a:t>
             </a:fld>
             <a:endParaRPr lang="en-US"/>
           </a:p>
@@ -1437,7 +1437,7 @@
           <a:p>
             <a:fld id="{92002A70-311A-4772-9C04-FF4E337CEBA6}" type="datetimeFigureOut">
               <a:rPr lang="en-US" smtClean="0"/>
-              <a:t>3/23/2020</a:t>
+              <a:t>3/24/2020</a:t>
             </a:fld>
             <a:endParaRPr lang="en-US"/>
           </a:p>
@@ -1858,7 +1858,7 @@
           <a:p>
             <a:fld id="{92002A70-311A-4772-9C04-FF4E337CEBA6}" type="datetimeFigureOut">
               <a:rPr lang="en-US" smtClean="0"/>
-              <a:t>3/23/2020</a:t>
+              <a:t>3/24/2020</a:t>
             </a:fld>
             <a:endParaRPr lang="en-US"/>
           </a:p>
@@ -2012,7 +2012,7 @@
           <a:p>
             <a:fld id="{92002A70-311A-4772-9C04-FF4E337CEBA6}" type="datetimeFigureOut">
               <a:rPr lang="en-US" smtClean="0"/>
-              <a:t>3/23/2020</a:t>
+              <a:t>3/24/2020</a:t>
             </a:fld>
             <a:endParaRPr lang="en-US"/>
           </a:p>
@@ -2138,7 +2138,7 @@
           <a:p>
             <a:fld id="{92002A70-311A-4772-9C04-FF4E337CEBA6}" type="datetimeFigureOut">
               <a:rPr lang="en-US" smtClean="0"/>
-              <a:t>3/23/2020</a:t>
+              <a:t>3/24/2020</a:t>
             </a:fld>
             <a:endParaRPr lang="en-US"/>
           </a:p>
@@ -2389,7 +2389,7 @@
           <a:p>
             <a:fld id="{92002A70-311A-4772-9C04-FF4E337CEBA6}" type="datetimeFigureOut">
               <a:rPr lang="en-US" smtClean="0"/>
-              <a:t>3/23/2020</a:t>
+              <a:t>3/24/2020</a:t>
             </a:fld>
             <a:endParaRPr lang="en-US"/>
           </a:p>
@@ -2839,7 +2839,7 @@
           <a:p>
             <a:fld id="{92002A70-311A-4772-9C04-FF4E337CEBA6}" type="datetimeFigureOut">
               <a:rPr lang="en-US" smtClean="0"/>
-              <a:t>3/23/2020</a:t>
+              <a:t>3/24/2020</a:t>
             </a:fld>
             <a:endParaRPr lang="en-US"/>
           </a:p>
@@ -3165,7 +3165,7 @@
           <a:p>
             <a:fld id="{92002A70-311A-4772-9C04-FF4E337CEBA6}" type="datetimeFigureOut">
               <a:rPr lang="en-US" smtClean="0"/>
-              <a:t>3/23/2020</a:t>
+              <a:t>3/24/2020</a:t>
             </a:fld>
             <a:endParaRPr lang="en-US"/>
           </a:p>
@@ -4391,11 +4391,7 @@
             </a:pPr>
             <a:r>
               <a:rPr lang="en-US" dirty="0" smtClean="0"/>
-              <a:t>Online multiplayer t</a:t>
-            </a:r>
-            <a:r>
-              <a:rPr lang="en-US" dirty="0" smtClean="0"/>
-              <a:t>rivia game</a:t>
+              <a:t>Online multiplayer trivia game</a:t>
             </a:r>
           </a:p>
           <a:p>
@@ -4696,11 +4692,7 @@
             </a:pPr>
             <a:r>
               <a:rPr lang="en-US" dirty="0" smtClean="0"/>
-              <a:t>m</a:t>
-            </a:r>
-            <a:r>
-              <a:rPr lang="en-US" dirty="0" smtClean="0"/>
-              <a:t>ongoose.js</a:t>
+              <a:t>mongoose.js</a:t>
             </a:r>
           </a:p>
           <a:p>
@@ -4995,599 +4987,30 @@
           </a:p>
         </p:txBody>
       </p:sp>
-      <p:graphicFrame>
-        <p:nvGraphicFramePr>
-          <p:cNvPr id="6" name="Table 5">
-            <a:extLst>
-              <a:ext uri="{FF2B5EF4-FFF2-40B4-BE49-F238E27FC236}">
-                <a16:creationId xmlns:a16="http://schemas.microsoft.com/office/drawing/2014/main" id="{6D22F124-8212-44F8-A49A-E5BAD070E158}"/>
-              </a:ext>
-            </a:extLst>
-          </p:cNvPr>
-          <p:cNvGraphicFramePr>
-            <a:graphicFrameLocks noGrp="1"/>
-          </p:cNvGraphicFramePr>
-          <p:nvPr>
-            <p:extLst>
-              <p:ext uri="{D42A27DB-BD31-4B8C-83A1-F6EECF244321}">
-                <p14:modId xmlns:p14="http://schemas.microsoft.com/office/powerpoint/2010/main" val="3265717260"/>
-              </p:ext>
-            </p:extLst>
-          </p:nvPr>
-        </p:nvGraphicFramePr>
-        <p:xfrm>
-          <a:off x="2967553" y="2152175"/>
-          <a:ext cx="5412967" cy="4110552"/>
-        </p:xfrm>
-        <a:graphic>
-          <a:graphicData uri="http://schemas.openxmlformats.org/drawingml/2006/table">
-            <a:tbl>
-              <a:tblPr>
-                <a:tableStyleId>{616DA210-FB5B-4158-B5E0-FEB733F419BA}</a:tableStyleId>
-              </a:tblPr>
-              <a:tblGrid>
-                <a:gridCol w="1870700">
-                  <a:extLst>
-                    <a:ext uri="{9D8B030D-6E8A-4147-A177-3AD203B41FA5}">
-                      <a16:colId xmlns:a16="http://schemas.microsoft.com/office/drawing/2014/main" val="781563413"/>
-                    </a:ext>
-                  </a:extLst>
-                </a:gridCol>
-                <a:gridCol w="3542267">
-                  <a:extLst>
-                    <a:ext uri="{9D8B030D-6E8A-4147-A177-3AD203B41FA5}">
-                      <a16:colId xmlns:a16="http://schemas.microsoft.com/office/drawing/2014/main" val="3866564030"/>
-                    </a:ext>
-                  </a:extLst>
-                </a:gridCol>
-              </a:tblGrid>
-              <a:tr h="456728">
-                <a:tc>
-                  <a:txBody>
-                    <a:bodyPr/>
-                    <a:lstStyle/>
-                    <a:p>
-                      <a:pPr marL="0" marR="0" fontAlgn="t">
-                        <a:spcBef>
-                          <a:spcPts val="0"/>
-                        </a:spcBef>
-                        <a:spcAft>
-                          <a:spcPts val="0"/>
-                        </a:spcAft>
-                      </a:pPr>
-                      <a:r>
-                        <a:rPr lang="en-US" sz="1200" dirty="0">
-                          <a:effectLst/>
-                        </a:rPr>
-                        <a:t>Task</a:t>
-                      </a:r>
-                      <a:endParaRPr lang="en-US" sz="1200" dirty="0">
-                        <a:effectLst/>
-                        <a:latin typeface="Times New Roman" panose="02020603050405020304" pitchFamily="18" charset="0"/>
-                      </a:endParaRPr>
-                    </a:p>
-                  </a:txBody>
-                  <a:tcPr marL="38100" marR="38100" marT="25400" marB="25400"/>
-                </a:tc>
-                <a:tc>
-                  <a:txBody>
-                    <a:bodyPr/>
-                    <a:lstStyle/>
-                    <a:p>
-                      <a:pPr marL="0" marR="0" fontAlgn="t">
-                        <a:spcBef>
-                          <a:spcPts val="0"/>
-                        </a:spcBef>
-                        <a:spcAft>
-                          <a:spcPts val="0"/>
-                        </a:spcAft>
-                      </a:pPr>
-                      <a:r>
-                        <a:rPr lang="en-US" sz="1200" dirty="0">
-                          <a:effectLst/>
-                        </a:rPr>
-                        <a:t>Who Completed</a:t>
-                      </a:r>
-                      <a:endParaRPr lang="en-US" sz="1200" dirty="0">
-                        <a:effectLst/>
-                        <a:latin typeface="Times New Roman" panose="02020603050405020304" pitchFamily="18" charset="0"/>
-                      </a:endParaRPr>
-                    </a:p>
-                  </a:txBody>
-                  <a:tcPr marL="38100" marR="38100" marT="25400" marB="25400"/>
-                </a:tc>
-                <a:extLst>
-                  <a:ext uri="{0D108BD9-81ED-4DB2-BD59-A6C34878D82A}">
-                    <a16:rowId xmlns:a16="http://schemas.microsoft.com/office/drawing/2014/main" val="3037452996"/>
-                  </a:ext>
-                </a:extLst>
-              </a:tr>
-              <a:tr h="456728">
-                <a:tc>
-                  <a:txBody>
-                    <a:bodyPr/>
-                    <a:lstStyle/>
-                    <a:p>
-                      <a:pPr marL="0" marR="0" fontAlgn="t">
-                        <a:spcBef>
-                          <a:spcPts val="0"/>
-                        </a:spcBef>
-                        <a:spcAft>
-                          <a:spcPts val="0"/>
-                        </a:spcAft>
-                      </a:pPr>
-                      <a:r>
-                        <a:rPr lang="en-US" sz="1200" dirty="0">
-                          <a:effectLst/>
-                          <a:latin typeface="Times New Roman" panose="02020603050405020304" pitchFamily="18" charset="0"/>
-                        </a:rPr>
-                        <a:t>GitHub Setup</a:t>
-                      </a:r>
-                    </a:p>
-                  </a:txBody>
-                  <a:tcPr marL="38100" marR="38100" marT="25400" marB="25400"/>
-                </a:tc>
-                <a:tc>
-                  <a:txBody>
-                    <a:bodyPr/>
-                    <a:lstStyle/>
-                    <a:p>
-                      <a:pPr marL="0" marR="0" algn="ctr" fontAlgn="t">
-                        <a:spcBef>
-                          <a:spcPts val="0"/>
-                        </a:spcBef>
-                        <a:spcAft>
-                          <a:spcPts val="0"/>
-                        </a:spcAft>
-                      </a:pPr>
-                      <a:r>
-                        <a:rPr lang="en-US" sz="1200" dirty="0">
-                          <a:effectLst/>
-                          <a:latin typeface="Times New Roman" panose="02020603050405020304" pitchFamily="18" charset="0"/>
-                        </a:rPr>
-                        <a:t>Josh</a:t>
-                      </a:r>
-                    </a:p>
-                  </a:txBody>
-                  <a:tcPr marL="38100" marR="38100" marT="25400" marB="25400"/>
-                </a:tc>
-                <a:extLst>
-                  <a:ext uri="{0D108BD9-81ED-4DB2-BD59-A6C34878D82A}">
-                    <a16:rowId xmlns:a16="http://schemas.microsoft.com/office/drawing/2014/main" val="1123737745"/>
-                  </a:ext>
-                </a:extLst>
-              </a:tr>
-              <a:tr h="456728">
-                <a:tc>
-                  <a:txBody>
-                    <a:bodyPr/>
-                    <a:lstStyle/>
-                    <a:p>
-                      <a:pPr marL="0" marR="0" fontAlgn="t">
-                        <a:spcBef>
-                          <a:spcPts val="0"/>
-                        </a:spcBef>
-                        <a:spcAft>
-                          <a:spcPts val="0"/>
-                        </a:spcAft>
-                      </a:pPr>
-                      <a:r>
-                        <a:rPr lang="en-US" sz="1200" dirty="0">
-                          <a:effectLst/>
-                        </a:rPr>
-                        <a:t>Use Cases/Requirements</a:t>
-                      </a:r>
-                      <a:endParaRPr lang="en-US" sz="1200" dirty="0">
-                        <a:effectLst/>
-                        <a:latin typeface="Times New Roman" panose="02020603050405020304" pitchFamily="18" charset="0"/>
-                      </a:endParaRPr>
-                    </a:p>
-                  </a:txBody>
-                  <a:tcPr marL="38100" marR="38100" marT="25400" marB="25400"/>
-                </a:tc>
-                <a:tc>
-                  <a:txBody>
-                    <a:bodyPr/>
-                    <a:lstStyle/>
-                    <a:p>
-                      <a:pPr marL="0" marR="0" algn="ctr" fontAlgn="t">
-                        <a:spcBef>
-                          <a:spcPts val="0"/>
-                        </a:spcBef>
-                        <a:spcAft>
-                          <a:spcPts val="0"/>
-                        </a:spcAft>
-                      </a:pPr>
-                      <a:r>
-                        <a:rPr lang="en-US" sz="1200">
-                          <a:effectLst/>
-                        </a:rPr>
-                        <a:t>Josh/Christian</a:t>
-                      </a:r>
-                      <a:endParaRPr lang="en-US" sz="1200" dirty="0">
-                        <a:effectLst/>
-                        <a:latin typeface="Times New Roman" panose="02020603050405020304" pitchFamily="18" charset="0"/>
-                      </a:endParaRPr>
-                    </a:p>
-                  </a:txBody>
-                  <a:tcPr marL="38100" marR="38100" marT="25400" marB="25400"/>
-                </a:tc>
-                <a:extLst>
-                  <a:ext uri="{0D108BD9-81ED-4DB2-BD59-A6C34878D82A}">
-                    <a16:rowId xmlns:a16="http://schemas.microsoft.com/office/drawing/2014/main" val="1991200881"/>
-                  </a:ext>
-                </a:extLst>
-              </a:tr>
-              <a:tr h="456728">
-                <a:tc>
-                  <a:txBody>
-                    <a:bodyPr/>
-                    <a:lstStyle/>
-                    <a:p>
-                      <a:pPr marL="0" marR="0" fontAlgn="t">
-                        <a:spcBef>
-                          <a:spcPts val="0"/>
-                        </a:spcBef>
-                        <a:spcAft>
-                          <a:spcPts val="0"/>
-                        </a:spcAft>
-                      </a:pPr>
-                      <a:r>
-                        <a:rPr lang="en-US" sz="1200" dirty="0">
-                          <a:effectLst/>
-                        </a:rPr>
-                        <a:t>Gantt Chart </a:t>
-                      </a:r>
-                      <a:endParaRPr lang="en-US" sz="1200" dirty="0">
-                        <a:effectLst/>
-                        <a:latin typeface="Times New Roman" panose="02020603050405020304" pitchFamily="18" charset="0"/>
-                      </a:endParaRPr>
-                    </a:p>
-                  </a:txBody>
-                  <a:tcPr marL="38100" marR="38100" marT="25400" marB="25400"/>
-                </a:tc>
-                <a:tc>
-                  <a:txBody>
-                    <a:bodyPr/>
-                    <a:lstStyle/>
-                    <a:p>
-                      <a:pPr marL="0" marR="0" algn="ctr" fontAlgn="t">
-                        <a:spcBef>
-                          <a:spcPts val="0"/>
-                        </a:spcBef>
-                        <a:spcAft>
-                          <a:spcPts val="0"/>
-                        </a:spcAft>
-                      </a:pPr>
-                      <a:r>
-                        <a:rPr lang="en-US" sz="1200" dirty="0">
-                          <a:effectLst/>
-                        </a:rPr>
-                        <a:t>Travis</a:t>
-                      </a:r>
-                      <a:endParaRPr lang="en-US" sz="1200" dirty="0">
-                        <a:effectLst/>
-                        <a:latin typeface="Times New Roman" panose="02020603050405020304" pitchFamily="18" charset="0"/>
-                      </a:endParaRPr>
-                    </a:p>
-                  </a:txBody>
-                  <a:tcPr marL="38100" marR="38100" marT="25400" marB="25400"/>
-                </a:tc>
-                <a:extLst>
-                  <a:ext uri="{0D108BD9-81ED-4DB2-BD59-A6C34878D82A}">
-                    <a16:rowId xmlns:a16="http://schemas.microsoft.com/office/drawing/2014/main" val="2655223713"/>
-                  </a:ext>
-                </a:extLst>
-              </a:tr>
-              <a:tr h="456728">
-                <a:tc>
-                  <a:txBody>
-                    <a:bodyPr/>
-                    <a:lstStyle/>
-                    <a:p>
-                      <a:pPr marL="0" marR="0" fontAlgn="t">
-                        <a:spcBef>
-                          <a:spcPts val="0"/>
-                        </a:spcBef>
-                        <a:spcAft>
-                          <a:spcPts val="0"/>
-                        </a:spcAft>
-                      </a:pPr>
-                      <a:r>
-                        <a:rPr lang="en-US" sz="1200" dirty="0">
-                          <a:effectLst/>
-                        </a:rPr>
-                        <a:t>SPMP </a:t>
-                      </a:r>
-                      <a:endParaRPr lang="en-US" sz="1200" dirty="0">
-                        <a:effectLst/>
-                        <a:latin typeface="Times New Roman" panose="02020603050405020304" pitchFamily="18" charset="0"/>
-                      </a:endParaRPr>
-                    </a:p>
-                  </a:txBody>
-                  <a:tcPr marL="38100" marR="38100" marT="25400" marB="25400"/>
-                </a:tc>
-                <a:tc>
-                  <a:txBody>
-                    <a:bodyPr/>
-                    <a:lstStyle/>
-                    <a:p>
-                      <a:pPr marL="0" marR="0" algn="ctr" fontAlgn="t">
-                        <a:spcBef>
-                          <a:spcPts val="0"/>
-                        </a:spcBef>
-                        <a:spcAft>
-                          <a:spcPts val="0"/>
-                        </a:spcAft>
-                      </a:pPr>
-                      <a:r>
-                        <a:rPr lang="en-US" sz="1200" dirty="0">
-                          <a:effectLst/>
-                        </a:rPr>
-                        <a:t>Travis, Christian</a:t>
-                      </a:r>
-                      <a:endParaRPr lang="en-US" sz="1200" dirty="0">
-                        <a:effectLst/>
-                        <a:latin typeface="Times New Roman" panose="02020603050405020304" pitchFamily="18" charset="0"/>
-                      </a:endParaRPr>
-                    </a:p>
-                  </a:txBody>
-                  <a:tcPr marL="38100" marR="38100" marT="25400" marB="25400"/>
-                </a:tc>
-                <a:extLst>
-                  <a:ext uri="{0D108BD9-81ED-4DB2-BD59-A6C34878D82A}">
-                    <a16:rowId xmlns:a16="http://schemas.microsoft.com/office/drawing/2014/main" val="2286771514"/>
-                  </a:ext>
-                </a:extLst>
-              </a:tr>
-              <a:tr h="456728">
-                <a:tc>
-                  <a:txBody>
-                    <a:bodyPr/>
-                    <a:lstStyle/>
-                    <a:p>
-                      <a:pPr marL="0" marR="0" fontAlgn="t">
-                        <a:spcBef>
-                          <a:spcPts val="0"/>
-                        </a:spcBef>
-                        <a:spcAft>
-                          <a:spcPts val="0"/>
-                        </a:spcAft>
-                      </a:pPr>
-                      <a:r>
-                        <a:rPr lang="en-US" sz="1200" dirty="0">
-                          <a:effectLst/>
-                        </a:rPr>
-                        <a:t>Technical Status Presentation</a:t>
-                      </a:r>
-                      <a:endParaRPr lang="en-US" sz="1200" dirty="0">
-                        <a:effectLst/>
-                        <a:latin typeface="Times New Roman" panose="02020603050405020304" pitchFamily="18" charset="0"/>
-                      </a:endParaRPr>
-                    </a:p>
-                  </a:txBody>
-                  <a:tcPr marL="38100" marR="38100" marT="25400" marB="25400"/>
-                </a:tc>
-                <a:tc>
-                  <a:txBody>
-                    <a:bodyPr/>
-                    <a:lstStyle/>
-                    <a:p>
-                      <a:pPr marL="0" marR="0" algn="ctr" fontAlgn="t">
-                        <a:spcBef>
-                          <a:spcPts val="0"/>
-                        </a:spcBef>
-                        <a:spcAft>
-                          <a:spcPts val="0"/>
-                        </a:spcAft>
-                      </a:pPr>
-                      <a:r>
-                        <a:rPr lang="en-US" sz="1200" dirty="0">
-                          <a:effectLst/>
-                        </a:rPr>
-                        <a:t>Travis</a:t>
-                      </a:r>
-                      <a:endParaRPr lang="en-US" sz="1200" dirty="0">
-                        <a:effectLst/>
-                        <a:latin typeface="Times New Roman" panose="02020603050405020304" pitchFamily="18" charset="0"/>
-                      </a:endParaRPr>
-                    </a:p>
-                  </a:txBody>
-                  <a:tcPr marL="38100" marR="38100" marT="25400" marB="25400"/>
-                </a:tc>
-                <a:extLst>
-                  <a:ext uri="{0D108BD9-81ED-4DB2-BD59-A6C34878D82A}">
-                    <a16:rowId xmlns:a16="http://schemas.microsoft.com/office/drawing/2014/main" val="3063263531"/>
-                  </a:ext>
-                </a:extLst>
-              </a:tr>
-              <a:tr h="456728">
-                <a:tc>
-                  <a:txBody>
-                    <a:bodyPr/>
-                    <a:lstStyle/>
-                    <a:p>
-                      <a:pPr marL="0" marR="0" fontAlgn="t">
-                        <a:spcBef>
-                          <a:spcPts val="0"/>
-                        </a:spcBef>
-                        <a:spcAft>
-                          <a:spcPts val="0"/>
-                        </a:spcAft>
-                      </a:pPr>
-                      <a:r>
-                        <a:rPr lang="en-US" sz="1200" dirty="0">
-                          <a:effectLst/>
-                        </a:rPr>
-                        <a:t>Integration/Unit Testing Skeleton</a:t>
-                      </a:r>
-                      <a:endParaRPr lang="en-US" sz="1200" dirty="0">
-                        <a:effectLst/>
-                        <a:latin typeface="Times New Roman" panose="02020603050405020304" pitchFamily="18" charset="0"/>
-                      </a:endParaRPr>
-                    </a:p>
-                  </a:txBody>
-                  <a:tcPr marL="38100" marR="38100" marT="25400" marB="25400"/>
-                </a:tc>
-                <a:tc>
-                  <a:txBody>
-                    <a:bodyPr/>
-                    <a:lstStyle/>
-                    <a:p>
-                      <a:pPr marL="0" marR="0" algn="ctr" fontAlgn="t">
-                        <a:spcBef>
-                          <a:spcPts val="0"/>
-                        </a:spcBef>
-                        <a:spcAft>
-                          <a:spcPts val="0"/>
-                        </a:spcAft>
-                      </a:pPr>
-                      <a:r>
-                        <a:rPr lang="en-US" sz="1200">
-                          <a:effectLst/>
-                        </a:rPr>
-                        <a:t> </a:t>
-                      </a:r>
-                      <a:endParaRPr lang="en-US" sz="1200">
-                        <a:effectLst/>
-                        <a:latin typeface="Times New Roman" panose="02020603050405020304" pitchFamily="18" charset="0"/>
-                      </a:endParaRPr>
-                    </a:p>
-                  </a:txBody>
-                  <a:tcPr marL="38100" marR="38100" marT="25400" marB="25400"/>
-                </a:tc>
-                <a:extLst>
-                  <a:ext uri="{0D108BD9-81ED-4DB2-BD59-A6C34878D82A}">
-                    <a16:rowId xmlns:a16="http://schemas.microsoft.com/office/drawing/2014/main" val="3986079374"/>
-                  </a:ext>
-                </a:extLst>
-              </a:tr>
-              <a:tr h="456728">
-                <a:tc>
-                  <a:txBody>
-                    <a:bodyPr/>
-                    <a:lstStyle/>
-                    <a:p>
-                      <a:pPr marL="0" marR="0" fontAlgn="t">
-                        <a:spcBef>
-                          <a:spcPts val="0"/>
-                        </a:spcBef>
-                        <a:spcAft>
-                          <a:spcPts val="0"/>
-                        </a:spcAft>
-                      </a:pPr>
-                      <a:r>
-                        <a:rPr lang="en-US" sz="1200" dirty="0">
-                          <a:effectLst/>
-                        </a:rPr>
-                        <a:t>Website/Game Development </a:t>
-                      </a:r>
-                      <a:endParaRPr lang="en-US" sz="1200" dirty="0">
-                        <a:effectLst/>
-                        <a:latin typeface="Times New Roman" panose="02020603050405020304" pitchFamily="18" charset="0"/>
-                      </a:endParaRPr>
-                    </a:p>
-                  </a:txBody>
-                  <a:tcPr marL="38100" marR="38100" marT="25400" marB="25400"/>
-                </a:tc>
-                <a:tc>
-                  <a:txBody>
-                    <a:bodyPr/>
-                    <a:lstStyle/>
-                    <a:p>
-                      <a:pPr marL="0" marR="0" algn="ctr" fontAlgn="t">
-                        <a:spcBef>
-                          <a:spcPts val="0"/>
-                        </a:spcBef>
-                        <a:spcAft>
-                          <a:spcPts val="0"/>
-                        </a:spcAft>
-                      </a:pPr>
-                      <a:r>
-                        <a:rPr lang="en-US" sz="1200" dirty="0">
-                          <a:effectLst/>
-                        </a:rPr>
-                        <a:t>Josh, Travis</a:t>
-                      </a:r>
-                      <a:endParaRPr lang="en-US" sz="1200" dirty="0">
-                        <a:effectLst/>
-                        <a:latin typeface="Times New Roman" panose="02020603050405020304" pitchFamily="18" charset="0"/>
-                      </a:endParaRPr>
-                    </a:p>
-                  </a:txBody>
-                  <a:tcPr marL="38100" marR="38100" marT="25400" marB="25400"/>
-                </a:tc>
-                <a:extLst>
-                  <a:ext uri="{0D108BD9-81ED-4DB2-BD59-A6C34878D82A}">
-                    <a16:rowId xmlns:a16="http://schemas.microsoft.com/office/drawing/2014/main" val="1625725533"/>
-                  </a:ext>
-                </a:extLst>
-              </a:tr>
-              <a:tr h="456728">
-                <a:tc>
-                  <a:txBody>
-                    <a:bodyPr/>
-                    <a:lstStyle/>
-                    <a:p>
-                      <a:pPr marL="0" marR="0" fontAlgn="t">
-                        <a:spcBef>
-                          <a:spcPts val="0"/>
-                        </a:spcBef>
-                        <a:spcAft>
-                          <a:spcPts val="0"/>
-                        </a:spcAft>
-                      </a:pPr>
-                      <a:r>
-                        <a:rPr lang="en-US" sz="1200" dirty="0">
-                          <a:effectLst/>
-                        </a:rPr>
-                        <a:t> Project Review </a:t>
-                      </a:r>
-                      <a:endParaRPr lang="en-US" sz="1200" dirty="0">
-                        <a:effectLst/>
-                        <a:latin typeface="Times New Roman" panose="02020603050405020304" pitchFamily="18" charset="0"/>
-                      </a:endParaRPr>
-                    </a:p>
-                  </a:txBody>
-                  <a:tcPr marL="38100" marR="38100" marT="25400" marB="25400"/>
-                </a:tc>
-                <a:tc>
-                  <a:txBody>
-                    <a:bodyPr/>
-                    <a:lstStyle/>
-                    <a:p>
-                      <a:pPr marL="0" marR="0" algn="ctr" fontAlgn="t">
-                        <a:spcBef>
-                          <a:spcPts val="0"/>
-                        </a:spcBef>
-                        <a:spcAft>
-                          <a:spcPts val="0"/>
-                        </a:spcAft>
-                      </a:pPr>
-                      <a:r>
-                        <a:rPr lang="en-US" sz="1200" dirty="0">
-                          <a:effectLst/>
-                        </a:rPr>
-                        <a:t> Travis, </a:t>
-                      </a:r>
-                      <a:endParaRPr lang="en-US" sz="1200" dirty="0">
-                        <a:effectLst/>
-                        <a:latin typeface="Times New Roman" panose="02020603050405020304" pitchFamily="18" charset="0"/>
-                      </a:endParaRPr>
-                    </a:p>
-                  </a:txBody>
-                  <a:tcPr marL="38100" marR="38100" marT="25400" marB="25400"/>
-                </a:tc>
-                <a:extLst>
-                  <a:ext uri="{0D108BD9-81ED-4DB2-BD59-A6C34878D82A}">
-                    <a16:rowId xmlns:a16="http://schemas.microsoft.com/office/drawing/2014/main" val="1176434584"/>
-                  </a:ext>
-                </a:extLst>
-              </a:tr>
-            </a:tbl>
-          </a:graphicData>
-        </a:graphic>
-      </p:graphicFrame>
+      <p:pic>
+        <p:nvPicPr>
+          <p:cNvPr id="3" name="Picture 2"/>
+          <p:cNvPicPr>
+            <a:picLocks noChangeAspect="1"/>
+          </p:cNvPicPr>
+          <p:nvPr/>
+        </p:nvPicPr>
+        <p:blipFill>
+          <a:blip r:embed="rId2"/>
+          <a:stretch>
+            <a:fillRect/>
+          </a:stretch>
+        </p:blipFill>
+        <p:spPr>
+          <a:xfrm>
+            <a:off x="4753028" y="2139315"/>
+            <a:ext cx="3000375" cy="3676650"/>
+          </a:xfrm>
+          <a:prstGeom prst="rect">
+            <a:avLst/>
+          </a:prstGeom>
+        </p:spPr>
+      </p:pic>
     </p:spTree>
     <p:extLst>
       <p:ext uri="{BB962C8B-B14F-4D97-AF65-F5344CB8AC3E}">

</xml_diff>

<commit_message>
Added logo to title slide
</commit_message>
<xml_diff>
--- a/Fit or Fail Technical Status Presentation.pptx
+++ b/Fit or Fail Technical Status Presentation.pptx
@@ -3753,6 +3753,36 @@
           </a:p>
         </p:txBody>
       </p:sp>
+      <p:pic>
+        <p:nvPicPr>
+          <p:cNvPr id="7" name="Picture 6"/>
+          <p:cNvPicPr>
+            <a:picLocks noChangeAspect="1"/>
+          </p:cNvPicPr>
+          <p:nvPr/>
+        </p:nvPicPr>
+        <p:blipFill>
+          <a:blip r:embed="rId2" cstate="hqprint">
+            <a:extLst>
+              <a:ext uri="{28A0092B-C50C-407E-A947-70E740481C1C}">
+                <a14:useLocalDpi xmlns:a14="http://schemas.microsoft.com/office/drawing/2010/main" val="0"/>
+              </a:ext>
+            </a:extLst>
+          </a:blip>
+          <a:stretch>
+            <a:fillRect/>
+          </a:stretch>
+        </p:blipFill>
+        <p:spPr>
+          <a:xfrm>
+            <a:off x="8287101" y="1122362"/>
+            <a:ext cx="2031766" cy="2031766"/>
+          </a:xfrm>
+          <a:prstGeom prst="rect">
+            <a:avLst/>
+          </a:prstGeom>
+        </p:spPr>
+      </p:pic>
     </p:spTree>
     <p:extLst>
       <p:ext uri="{BB962C8B-B14F-4D97-AF65-F5344CB8AC3E}">

</xml_diff>

<commit_message>
Basic test skeleton and minor PP updates
</commit_message>
<xml_diff>
--- a/Fit or Fail Technical Status Presentation.pptx
+++ b/Fit or Fail Technical Status Presentation.pptx
@@ -5115,7 +5115,7 @@
         <p:spPr>
           <a:xfrm>
             <a:off x="1085850" y="1943100"/>
-            <a:ext cx="9972675" cy="2585323"/>
+            <a:ext cx="9972675" cy="2862322"/>
           </a:xfrm>
           <a:prstGeom prst="rect">
             <a:avLst/>
@@ -5144,8 +5144,13 @@
             </a:pPr>
             <a:r>
               <a:rPr lang="en-US" dirty="0"/>
-              <a:t>Has many phases/part</a:t>
-            </a:r>
+              <a:t>Has many </a:t>
+            </a:r>
+            <a:r>
+              <a:rPr lang="en-US" dirty="0" smtClean="0"/>
+              <a:t>phases/parts</a:t>
+            </a:r>
+            <a:endParaRPr lang="en-US" dirty="0"/>
           </a:p>
           <a:p>
             <a:pPr marL="742950" lvl="1" indent="-285750">
@@ -5156,6 +5161,14 @@
               <a:rPr lang="en-US" dirty="0"/>
               <a:t>Each part relies on the previous parts </a:t>
             </a:r>
+            <a:endParaRPr lang="en-US" dirty="0" smtClean="0"/>
+          </a:p>
+          <a:p>
+            <a:pPr marL="742950" lvl="1" indent="-285750">
+              <a:buFont typeface="Arial" panose="020B0604020202020204" pitchFamily="34" charset="0"/>
+              <a:buChar char="•"/>
+            </a:pPr>
+            <a:endParaRPr lang="en-US" dirty="0"/>
           </a:p>
           <a:p>
             <a:pPr marL="285750" indent="-285750">
@@ -5241,7 +5254,7 @@
         </p:blipFill>
         <p:spPr>
           <a:xfrm>
-            <a:off x="6096000" y="2123144"/>
+            <a:off x="6072187" y="2261644"/>
             <a:ext cx="5944115" cy="2225233"/>
           </a:xfrm>
           <a:prstGeom prst="rect">
@@ -5310,28 +5323,49 @@
       </p:sp>
       <p:pic>
         <p:nvPicPr>
-          <p:cNvPr id="4" name="Picture 3">
-            <a:extLst>
-              <a:ext uri="{FF2B5EF4-FFF2-40B4-BE49-F238E27FC236}">
-                <a16:creationId xmlns:a16="http://schemas.microsoft.com/office/drawing/2014/main" id="{A44A0E3D-3FC7-4A5C-B7BF-73A76C23ECF5}"/>
-              </a:ext>
-            </a:extLst>
-          </p:cNvPr>
+          <p:cNvPr id="3" name="Picture 2"/>
           <p:cNvPicPr>
             <a:picLocks noChangeAspect="1"/>
           </p:cNvPicPr>
           <p:nvPr/>
         </p:nvPicPr>
         <p:blipFill>
-          <a:blip r:embed="rId2"/>
+          <a:blip r:embed="rId2">
+            <a:extLst>
+              <a:ext uri="{BEBA8EAE-BF5A-486C-A8C5-ECC9F3942E4B}">
+                <a14:imgProps xmlns:a14="http://schemas.microsoft.com/office/drawing/2010/main">
+                  <a14:imgLayer r:embed="rId3">
+                    <a14:imgEffect>
+                      <a14:backgroundRemoval t="488" b="100000" l="0" r="100000">
+                        <a14:foregroundMark x1="30774" y1="5488" x2="31229" y2="5976"/>
+                        <a14:foregroundMark x1="25939" y1="79390" x2="26394" y2="79390"/>
+                        <a14:foregroundMark x1="25711" y1="72927" x2="25939" y2="73902"/>
+                        <a14:foregroundMark x1="28441" y1="59024" x2="28441" y2="59024"/>
+                        <a14:foregroundMark x1="28441" y1="66463" x2="28441" y2="66463"/>
+                        <a14:foregroundMark x1="25939" y1="67439" x2="25939" y2="67439"/>
+                        <a14:foregroundMark x1="26394" y1="59512" x2="26394" y2="59512"/>
+                        <a14:foregroundMark x1="57850" y1="61098" x2="57850" y2="61098"/>
+                        <a14:foregroundMark x1="41411" y1="70488" x2="41411" y2="70488"/>
+                        <a14:foregroundMark x1="39363" y1="75488" x2="39363" y2="75488"/>
+                        <a14:foregroundMark x1="30091" y1="81341" x2="30091" y2="81341"/>
+                      </a14:backgroundRemoval>
+                    </a14:imgEffect>
+                  </a14:imgLayer>
+                </a14:imgProps>
+              </a:ext>
+              <a:ext uri="{28A0092B-C50C-407E-A947-70E740481C1C}">
+                <a14:useLocalDpi xmlns:a14="http://schemas.microsoft.com/office/drawing/2010/main" val="0"/>
+              </a:ext>
+            </a:extLst>
+          </a:blip>
           <a:stretch>
             <a:fillRect/>
           </a:stretch>
         </p:blipFill>
         <p:spPr>
           <a:xfrm>
-            <a:off x="1138237" y="1771702"/>
-            <a:ext cx="9915525" cy="4401363"/>
+            <a:off x="1963401" y="1996216"/>
+            <a:ext cx="8579629" cy="4001875"/>
           </a:xfrm>
           <a:prstGeom prst="rect">
             <a:avLst/>

</xml_diff>

<commit_message>
Updated PP, installed react-scripts for fitorfail, updated Completed Tasks
</commit_message>
<xml_diff>
--- a/Fit or Fail Technical Status Presentation.pptx
+++ b/Fit or Fail Technical Status Presentation.pptx
@@ -14,10 +14,11 @@
     <p:sldId id="264" r:id="rId8"/>
     <p:sldId id="261" r:id="rId9"/>
     <p:sldId id="260" r:id="rId10"/>
-    <p:sldId id="265" r:id="rId11"/>
-    <p:sldId id="266" r:id="rId12"/>
-    <p:sldId id="267" r:id="rId13"/>
-    <p:sldId id="269" r:id="rId14"/>
+    <p:sldId id="270" r:id="rId11"/>
+    <p:sldId id="271" r:id="rId12"/>
+    <p:sldId id="266" r:id="rId13"/>
+    <p:sldId id="267" r:id="rId14"/>
+    <p:sldId id="269" r:id="rId15"/>
   </p:sldIdLst>
   <p:sldSz cx="12192000" cy="6858000"/>
   <p:notesSz cx="6858000" cy="9144000"/>
@@ -3815,13 +3816,7 @@
       </p:grpSpPr>
       <p:sp>
         <p:nvSpPr>
-          <p:cNvPr id="2" name="Title 1">
-            <a:extLst>
-              <a:ext uri="{FF2B5EF4-FFF2-40B4-BE49-F238E27FC236}">
-                <a16:creationId xmlns:a16="http://schemas.microsoft.com/office/drawing/2014/main" id="{F0BDCF57-F91A-472C-8BF4-1B035AB72E99}"/>
-              </a:ext>
-            </a:extLst>
-          </p:cNvPr>
+          <p:cNvPr id="2" name="Title 1"/>
           <p:cNvSpPr>
             <a:spLocks noGrp="1"/>
           </p:cNvSpPr>
@@ -3836,16 +3831,80 @@
           <a:p>
             <a:pPr algn="ctr"/>
             <a:r>
-              <a:rPr lang="en-US" dirty="0"/>
-              <a:t>Current Working Prototype</a:t>
-            </a:r>
+              <a:rPr lang="en-US" dirty="0" smtClean="0"/>
+              <a:t>Current Status</a:t>
+            </a:r>
+            <a:endParaRPr lang="en-US" dirty="0"/>
+          </a:p>
+        </p:txBody>
+      </p:sp>
+      <p:sp>
+        <p:nvSpPr>
+          <p:cNvPr id="3" name="Content Placeholder 2"/>
+          <p:cNvSpPr>
+            <a:spLocks noGrp="1"/>
+          </p:cNvSpPr>
+          <p:nvPr>
+            <p:ph idx="1"/>
+          </p:nvPr>
+        </p:nvSpPr>
+        <p:spPr/>
+        <p:txBody>
+          <a:bodyPr/>
+          <a:lstStyle/>
+          <a:p>
+            <a:r>
+              <a:rPr lang="en-US" dirty="0" smtClean="0"/>
+              <a:t>Our frontend is still in the making</a:t>
+            </a:r>
+          </a:p>
+          <a:p>
+            <a:pPr lvl="1"/>
+            <a:r>
+              <a:rPr lang="en-US" dirty="0" smtClean="0"/>
+              <a:t>Learning React</a:t>
+            </a:r>
+          </a:p>
+          <a:p>
+            <a:r>
+              <a:rPr lang="en-US" dirty="0" smtClean="0"/>
+              <a:t>Backend has basic functionality</a:t>
+            </a:r>
+          </a:p>
+          <a:p>
+            <a:pPr lvl="1"/>
+            <a:r>
+              <a:rPr lang="en-US" dirty="0" smtClean="0"/>
+              <a:t>Database</a:t>
+            </a:r>
+          </a:p>
+          <a:p>
+            <a:pPr lvl="2"/>
+            <a:r>
+              <a:rPr lang="en-US" dirty="0" smtClean="0"/>
+              <a:t>Stores Users, Teams, Questions to choose from</a:t>
+            </a:r>
+          </a:p>
+          <a:p>
+            <a:pPr lvl="1"/>
+            <a:r>
+              <a:rPr lang="en-US" dirty="0" smtClean="0"/>
+              <a:t>Register/Log in</a:t>
+            </a:r>
+          </a:p>
+          <a:p>
+            <a:r>
+              <a:rPr lang="en-US" dirty="0" smtClean="0"/>
+              <a:t>Still hooking everything together</a:t>
+            </a:r>
+            <a:endParaRPr lang="en-US" dirty="0"/>
           </a:p>
         </p:txBody>
       </p:sp>
     </p:spTree>
     <p:extLst>
       <p:ext uri="{BB962C8B-B14F-4D97-AF65-F5344CB8AC3E}">
-        <p14:creationId xmlns:p14="http://schemas.microsoft.com/office/powerpoint/2010/main" val="898672075"/>
+        <p14:creationId xmlns:p14="http://schemas.microsoft.com/office/powerpoint/2010/main" val="1616784116"/>
       </p:ext>
     </p:extLst>
   </p:cSld>
@@ -3856,6 +3915,148 @@
 </file>
 
 <file path=ppt/slides/slide11.xml><?xml version="1.0" encoding="utf-8"?>
+<p:sld xmlns:a="http://schemas.openxmlformats.org/drawingml/2006/main" xmlns:r="http://schemas.openxmlformats.org/officeDocument/2006/relationships" xmlns:p="http://schemas.openxmlformats.org/presentationml/2006/main">
+  <p:cSld>
+    <p:spTree>
+      <p:nvGrpSpPr>
+        <p:cNvPr id="1" name=""/>
+        <p:cNvGrpSpPr/>
+        <p:nvPr/>
+      </p:nvGrpSpPr>
+      <p:grpSpPr>
+        <a:xfrm>
+          <a:off x="0" y="0"/>
+          <a:ext cx="0" cy="0"/>
+          <a:chOff x="0" y="0"/>
+          <a:chExt cx="0" cy="0"/>
+        </a:xfrm>
+      </p:grpSpPr>
+      <p:sp>
+        <p:nvSpPr>
+          <p:cNvPr id="2" name="Title 1"/>
+          <p:cNvSpPr>
+            <a:spLocks noGrp="1"/>
+          </p:cNvSpPr>
+          <p:nvPr>
+            <p:ph type="title"/>
+          </p:nvPr>
+        </p:nvSpPr>
+        <p:spPr/>
+        <p:txBody>
+          <a:bodyPr/>
+          <a:lstStyle/>
+          <a:p>
+            <a:pPr algn="ctr"/>
+            <a:r>
+              <a:rPr lang="en-US" dirty="0" smtClean="0"/>
+              <a:t>Planned Pages</a:t>
+            </a:r>
+            <a:endParaRPr lang="en-US" dirty="0"/>
+          </a:p>
+        </p:txBody>
+      </p:sp>
+      <p:sp>
+        <p:nvSpPr>
+          <p:cNvPr id="3" name="Content Placeholder 2"/>
+          <p:cNvSpPr>
+            <a:spLocks noGrp="1"/>
+          </p:cNvSpPr>
+          <p:nvPr>
+            <p:ph idx="1"/>
+          </p:nvPr>
+        </p:nvSpPr>
+        <p:spPr/>
+        <p:txBody>
+          <a:bodyPr>
+            <a:normAutofit fontScale="85000" lnSpcReduction="20000"/>
+          </a:bodyPr>
+          <a:lstStyle/>
+          <a:p>
+            <a:r>
+              <a:rPr lang="en-US" dirty="0"/>
+              <a:t>I</a:t>
+            </a:r>
+            <a:r>
+              <a:rPr lang="en-US" dirty="0" smtClean="0"/>
+              <a:t>ndex</a:t>
+            </a:r>
+          </a:p>
+          <a:p>
+            <a:pPr lvl="1"/>
+            <a:r>
+              <a:rPr lang="en-US" dirty="0" smtClean="0"/>
+              <a:t>Homepage/Welcome screen</a:t>
+            </a:r>
+          </a:p>
+          <a:p>
+            <a:pPr lvl="1"/>
+            <a:r>
+              <a:rPr lang="en-US" dirty="0" smtClean="0"/>
+              <a:t>Big play button, either prompting the user to log in, or taking them directly to the Game page if already logged in</a:t>
+            </a:r>
+          </a:p>
+          <a:p>
+            <a:r>
+              <a:rPr lang="en-US" dirty="0" smtClean="0"/>
+              <a:t>Game</a:t>
+            </a:r>
+          </a:p>
+          <a:p>
+            <a:r>
+              <a:rPr lang="en-US" dirty="0" smtClean="0"/>
+              <a:t>User profile</a:t>
+            </a:r>
+          </a:p>
+          <a:p>
+            <a:pPr lvl="1"/>
+            <a:r>
+              <a:rPr lang="en-US" dirty="0" smtClean="0"/>
+              <a:t>See User’s statistics</a:t>
+            </a:r>
+          </a:p>
+          <a:p>
+            <a:r>
+              <a:rPr lang="en-US" dirty="0" smtClean="0"/>
+              <a:t>Team page</a:t>
+            </a:r>
+          </a:p>
+          <a:p>
+            <a:pPr lvl="1"/>
+            <a:r>
+              <a:rPr lang="en-US" dirty="0" smtClean="0"/>
+              <a:t>See Team’s statistics</a:t>
+            </a:r>
+          </a:p>
+          <a:p>
+            <a:r>
+              <a:rPr lang="en-US" dirty="0" smtClean="0"/>
+              <a:t>Leaderboards</a:t>
+            </a:r>
+          </a:p>
+          <a:p>
+            <a:pPr lvl="1"/>
+            <a:r>
+              <a:rPr lang="en-US" dirty="0" smtClean="0"/>
+              <a:t>See top-ranking Users and Teams</a:t>
+            </a:r>
+            <a:endParaRPr lang="en-US" dirty="0"/>
+          </a:p>
+        </p:txBody>
+      </p:sp>
+    </p:spTree>
+    <p:extLst>
+      <p:ext uri="{BB962C8B-B14F-4D97-AF65-F5344CB8AC3E}">
+        <p14:creationId xmlns:p14="http://schemas.microsoft.com/office/powerpoint/2010/main" val="689910493"/>
+      </p:ext>
+    </p:extLst>
+  </p:cSld>
+  <p:clrMapOvr>
+    <a:masterClrMapping/>
+  </p:clrMapOvr>
+</p:sld>
+</file>
+
+<file path=ppt/slides/slide12.xml><?xml version="1.0" encoding="utf-8"?>
 <p:sld xmlns:a="http://schemas.openxmlformats.org/drawingml/2006/main" xmlns:r="http://schemas.openxmlformats.org/officeDocument/2006/relationships" xmlns:p="http://schemas.openxmlformats.org/presentationml/2006/main">
   <p:cSld>
     <p:spTree>
@@ -3939,7 +4140,7 @@
 </p:sld>
 </file>
 
-<file path=ppt/slides/slide12.xml><?xml version="1.0" encoding="utf-8"?>
+<file path=ppt/slides/slide13.xml><?xml version="1.0" encoding="utf-8"?>
 <p:sld xmlns:a="http://schemas.openxmlformats.org/drawingml/2006/main" xmlns:r="http://schemas.openxmlformats.org/officeDocument/2006/relationships" xmlns:p="http://schemas.openxmlformats.org/presentationml/2006/main">
   <p:cSld>
     <p:spTree>
@@ -4023,7 +4224,7 @@
 </p:sld>
 </file>
 
-<file path=ppt/slides/slide13.xml><?xml version="1.0" encoding="utf-8"?>
+<file path=ppt/slides/slide14.xml><?xml version="1.0" encoding="utf-8"?>
 <p:sld xmlns:a="http://schemas.openxmlformats.org/drawingml/2006/main" xmlns:r="http://schemas.openxmlformats.org/officeDocument/2006/relationships" xmlns:p="http://schemas.openxmlformats.org/presentationml/2006/main">
   <p:cSld>
     <p:spTree>
@@ -4086,20 +4287,11 @@
           <a:p>
             <a:r>
               <a:rPr lang="en-US" dirty="0" smtClean="0"/>
-              <a:t>Put logo on title slide</a:t>
-            </a:r>
-          </a:p>
-          <a:p>
-            <a:pPr lvl="1"/>
-            <a:r>
-              <a:rPr lang="en-US" dirty="0" smtClean="0"/>
-              <a:t>Someone needs to first complete our logo</a:t>
-            </a:r>
-          </a:p>
-          <a:p>
-            <a:r>
-              <a:rPr lang="en-US" dirty="0" smtClean="0"/>
-              <a:t>Update all our flow diagrams to represent our new flow</a:t>
+              <a:t>Update </a:t>
+            </a:r>
+            <a:r>
+              <a:rPr lang="en-US" dirty="0" smtClean="0"/>
+              <a:t>all our flow diagrams to represent our new flow</a:t>
             </a:r>
           </a:p>
           <a:p>
@@ -4833,8 +5025,19 @@
           <a:p>
             <a:pPr algn="ctr"/>
             <a:r>
+              <a:rPr lang="en-US" dirty="0" smtClean="0"/>
+              <a:t>Deliverables:</a:t>
+            </a:r>
+            <a:br>
+              <a:rPr lang="en-US" dirty="0" smtClean="0"/>
+            </a:br>
+            <a:r>
+              <a:rPr lang="en-US" dirty="0" smtClean="0"/>
+              <a:t>Work </a:t>
+            </a:r>
+            <a:r>
               <a:rPr lang="en-US" dirty="0"/>
-              <a:t>Work Breakdown Structure</a:t>
+              <a:t>Breakdown Structure</a:t>
             </a:r>
           </a:p>
         </p:txBody>
@@ -4922,8 +5125,19 @@
           <a:p>
             <a:pPr algn="ctr"/>
             <a:r>
+              <a:rPr lang="en-US" dirty="0" smtClean="0"/>
+              <a:t>Deliverables:</a:t>
+            </a:r>
+            <a:br>
+              <a:rPr lang="en-US" dirty="0" smtClean="0"/>
+            </a:br>
+            <a:r>
+              <a:rPr lang="en-US" dirty="0" smtClean="0"/>
+              <a:t>Work </a:t>
+            </a:r>
+            <a:r>
               <a:rPr lang="en-US" dirty="0"/>
-              <a:t>Work Completion Timeline</a:t>
+              <a:t>Completion Timeline</a:t>
             </a:r>
           </a:p>
         </p:txBody>
@@ -5011,15 +5225,26 @@
           <a:p>
             <a:pPr algn="ctr"/>
             <a:r>
+              <a:rPr lang="en-US" dirty="0" smtClean="0"/>
+              <a:t>Deliverables:</a:t>
+            </a:r>
+            <a:br>
+              <a:rPr lang="en-US" dirty="0" smtClean="0"/>
+            </a:br>
+            <a:r>
+              <a:rPr lang="en-US" dirty="0" smtClean="0"/>
+              <a:t>Completed </a:t>
+            </a:r>
+            <a:r>
               <a:rPr lang="en-US" dirty="0"/>
-              <a:t>Completed Tasks </a:t>
+              <a:t>Tasks </a:t>
             </a:r>
           </a:p>
         </p:txBody>
       </p:sp>
       <p:pic>
         <p:nvPicPr>
-          <p:cNvPr id="3" name="Picture 2"/>
+          <p:cNvPr id="4" name="Picture 3"/>
           <p:cNvPicPr>
             <a:picLocks noChangeAspect="1"/>
           </p:cNvPicPr>
@@ -5033,7 +5258,7 @@
         </p:blipFill>
         <p:spPr>
           <a:xfrm>
-            <a:off x="4753028" y="2139315"/>
+            <a:off x="4753028" y="2118213"/>
             <a:ext cx="3000375" cy="3676650"/>
           </a:xfrm>
           <a:prstGeom prst="rect">
@@ -5094,8 +5319,19 @@
           <a:p>
             <a:pPr algn="ctr"/>
             <a:r>
+              <a:rPr lang="en-US" dirty="0" smtClean="0"/>
+              <a:t>Deliverables:</a:t>
+            </a:r>
+            <a:br>
+              <a:rPr lang="en-US" dirty="0" smtClean="0"/>
+            </a:br>
+            <a:r>
+              <a:rPr lang="en-US" dirty="0" smtClean="0"/>
+              <a:t>Process </a:t>
+            </a:r>
+            <a:r>
               <a:rPr lang="en-US" dirty="0"/>
-              <a:t>Process model</a:t>
+              <a:t>model</a:t>
             </a:r>
           </a:p>
         </p:txBody>
@@ -5315,8 +5551,19 @@
           <a:p>
             <a:pPr algn="ctr"/>
             <a:r>
+              <a:rPr lang="en-US" dirty="0" smtClean="0"/>
+              <a:t>Deliverables:</a:t>
+            </a:r>
+            <a:br>
+              <a:rPr lang="en-US" dirty="0" smtClean="0"/>
+            </a:br>
+            <a:r>
+              <a:rPr lang="en-US" dirty="0" smtClean="0"/>
+              <a:t>Website </a:t>
+            </a:r>
+            <a:r>
               <a:rPr lang="en-US" dirty="0"/>
-              <a:t>Website game layout</a:t>
+              <a:t>game layout</a:t>
             </a:r>
           </a:p>
         </p:txBody>

</xml_diff>